<commit_message>
added the code to put grey pixels
</commit_message>
<xml_diff>
--- a/Outputs/CoincedencesPresentation.pptx
+++ b/Outputs/CoincedencesPresentation.pptx
@@ -3173,83 +3173,68 @@
           <a:chExt cx="0" cy="0"/>
         </a:xfrm>
       </p:grpSpPr>
-      <p:grpSp>
-        <p:nvGrpSpPr>
-          <p:cNvPr id="10" name="Group 9"/>
-          <p:cNvGrpSpPr/>
+      <p:pic>
+        <p:nvPicPr>
+          <p:cNvPr id="3" name="Picture 2" descr="NYC.png"/>
+          <p:cNvPicPr>
+            <a:picLocks noChangeAspect="1"/>
+          </p:cNvPicPr>
           <p:nvPr/>
-        </p:nvGrpSpPr>
-        <p:grpSpPr>
+        </p:nvPicPr>
+        <p:blipFill>
+          <a:blip r:embed="rId2">
+            <a:extLst>
+              <a:ext uri="{28A0092B-C50C-407E-A947-70E740481C1C}">
+                <a14:useLocalDpi xmlns:a14="http://schemas.microsoft.com/office/drawing/2010/main" val="0"/>
+              </a:ext>
+            </a:extLst>
+          </a:blip>
+          <a:stretch>
+            <a:fillRect/>
+          </a:stretch>
+        </p:blipFill>
+        <p:spPr>
           <a:xfrm>
             <a:off x="946291" y="0"/>
             <a:ext cx="7251419" cy="6858000"/>
-            <a:chOff x="0" y="0"/>
-            <a:chExt cx="7251419" cy="6858000"/>
           </a:xfrm>
-        </p:grpSpPr>
-        <p:pic>
-          <p:nvPicPr>
-            <p:cNvPr id="5" name="Picture 4" descr="NYC.png"/>
-            <p:cNvPicPr>
-              <a:picLocks noChangeAspect="1"/>
-            </p:cNvPicPr>
-            <p:nvPr/>
-          </p:nvPicPr>
-          <p:blipFill>
-            <a:blip r:embed="rId2">
-              <a:extLst>
-                <a:ext uri="{28A0092B-C50C-407E-A947-70E740481C1C}">
-                  <a14:useLocalDpi xmlns:a14="http://schemas.microsoft.com/office/drawing/2010/main" val="0"/>
-                </a:ext>
-              </a:extLst>
-            </a:blip>
-            <a:stretch>
-              <a:fillRect/>
-            </a:stretch>
-          </p:blipFill>
-          <p:spPr>
-            <a:xfrm>
-              <a:off x="0" y="0"/>
-              <a:ext cx="7251419" cy="6858000"/>
-            </a:xfrm>
-            <a:prstGeom prst="rect">
-              <a:avLst/>
-            </a:prstGeom>
-          </p:spPr>
-        </p:pic>
-        <p:sp>
-          <p:nvSpPr>
-            <p:cNvPr id="6" name="TextBox 5"/>
-            <p:cNvSpPr txBox="1"/>
-            <p:nvPr/>
-          </p:nvSpPr>
-          <p:spPr>
-            <a:xfrm>
-              <a:off x="1137373" y="66007"/>
-              <a:ext cx="5307738" cy="369332"/>
-            </a:xfrm>
-            <a:prstGeom prst="rect">
-              <a:avLst/>
-            </a:prstGeom>
-            <a:solidFill>
-              <a:schemeClr val="bg1"/>
-            </a:solidFill>
-          </p:spPr>
-          <p:txBody>
-            <a:bodyPr wrap="square" rtlCol="0">
-              <a:spAutoFit/>
-            </a:bodyPr>
-            <a:lstStyle/>
-            <a:p>
-              <a:r>
-                <a:rPr lang="en-US" dirty="0" smtClean="0"/>
-                <a:t>New York City Coincidence Ratios of Failing features</a:t>
-              </a:r>
-              <a:endParaRPr lang="en-US" dirty="0"/>
-            </a:p>
-          </p:txBody>
-        </p:sp>
-      </p:grpSp>
+          <a:prstGeom prst="rect">
+            <a:avLst/>
+          </a:prstGeom>
+        </p:spPr>
+      </p:pic>
+      <p:sp>
+        <p:nvSpPr>
+          <p:cNvPr id="6" name="TextBox 5"/>
+          <p:cNvSpPr txBox="1"/>
+          <p:nvPr/>
+        </p:nvSpPr>
+        <p:spPr>
+          <a:xfrm>
+            <a:off x="2083664" y="66007"/>
+            <a:ext cx="5307738" cy="369332"/>
+          </a:xfrm>
+          <a:prstGeom prst="rect">
+            <a:avLst/>
+          </a:prstGeom>
+          <a:solidFill>
+            <a:schemeClr val="bg1"/>
+          </a:solidFill>
+        </p:spPr>
+        <p:txBody>
+          <a:bodyPr wrap="square" rtlCol="0">
+            <a:spAutoFit/>
+          </a:bodyPr>
+          <a:lstStyle/>
+          <a:p>
+            <a:r>
+              <a:rPr lang="en-US" dirty="0" smtClean="0"/>
+              <a:t>New York City Coincidence Ratios of Failing features</a:t>
+            </a:r>
+            <a:endParaRPr lang="en-US" dirty="0"/>
+          </a:p>
+        </p:txBody>
+      </p:sp>
     </p:spTree>
     <p:extLst>
       <p:ext uri="{BB962C8B-B14F-4D97-AF65-F5344CB8AC3E}">

</xml_diff>

<commit_message>
updated deck of slides and updated code for gray slots
</commit_message>
<xml_diff>
--- a/Outputs/CoincedencesPresentation.pptx
+++ b/Outputs/CoincedencesPresentation.pptx
@@ -3153,6 +3153,13 @@
   <p:clrMapOvr>
     <a:masterClrMapping/>
   </p:clrMapOvr>
+  <p:timing>
+    <p:tnLst>
+      <p:par>
+        <p:cTn xmlns:p14="http://schemas.microsoft.com/office/powerpoint/2010/main" id="1" dur="indefinite" restart="never" nodeType="tmRoot"/>
+      </p:par>
+    </p:tnLst>
+  </p:timing>
 </p:sld>
 </file>
 
@@ -3272,83 +3279,68 @@
           <a:chExt cx="0" cy="0"/>
         </a:xfrm>
       </p:grpSpPr>
-      <p:grpSp>
-        <p:nvGrpSpPr>
-          <p:cNvPr id="4" name="Group 3"/>
-          <p:cNvGrpSpPr/>
+      <p:pic>
+        <p:nvPicPr>
+          <p:cNvPr id="2" name="Picture 1" descr="Manhattan.png"/>
+          <p:cNvPicPr>
+            <a:picLocks noChangeAspect="1"/>
+          </p:cNvPicPr>
           <p:nvPr/>
-        </p:nvGrpSpPr>
-        <p:grpSpPr>
+        </p:nvPicPr>
+        <p:blipFill>
+          <a:blip r:embed="rId2">
+            <a:extLst>
+              <a:ext uri="{28A0092B-C50C-407E-A947-70E740481C1C}">
+                <a14:useLocalDpi xmlns:a14="http://schemas.microsoft.com/office/drawing/2010/main" val="0"/>
+              </a:ext>
+            </a:extLst>
+          </a:blip>
+          <a:stretch>
+            <a:fillRect/>
+          </a:stretch>
+        </p:blipFill>
+        <p:spPr>
           <a:xfrm>
             <a:off x="946291" y="0"/>
             <a:ext cx="7251419" cy="6858000"/>
-            <a:chOff x="0" y="0"/>
-            <a:chExt cx="7251419" cy="6858000"/>
           </a:xfrm>
-        </p:grpSpPr>
-        <p:pic>
-          <p:nvPicPr>
-            <p:cNvPr id="3" name="Picture 2" descr="Manhattan.png"/>
-            <p:cNvPicPr>
-              <a:picLocks noChangeAspect="1"/>
-            </p:cNvPicPr>
-            <p:nvPr/>
-          </p:nvPicPr>
-          <p:blipFill>
-            <a:blip r:embed="rId2">
-              <a:extLst>
-                <a:ext uri="{28A0092B-C50C-407E-A947-70E740481C1C}">
-                  <a14:useLocalDpi xmlns:a14="http://schemas.microsoft.com/office/drawing/2010/main" val="0"/>
-                </a:ext>
-              </a:extLst>
-            </a:blip>
-            <a:stretch>
-              <a:fillRect/>
-            </a:stretch>
-          </p:blipFill>
-          <p:spPr>
-            <a:xfrm>
-              <a:off x="0" y="0"/>
-              <a:ext cx="7251419" cy="6858000"/>
-            </a:xfrm>
-            <a:prstGeom prst="rect">
-              <a:avLst/>
-            </a:prstGeom>
-          </p:spPr>
-        </p:pic>
-        <p:sp>
-          <p:nvSpPr>
-            <p:cNvPr id="6" name="TextBox 5"/>
-            <p:cNvSpPr txBox="1"/>
-            <p:nvPr/>
-          </p:nvSpPr>
-          <p:spPr>
-            <a:xfrm>
-              <a:off x="890942" y="66007"/>
-              <a:ext cx="5743730" cy="369332"/>
-            </a:xfrm>
-            <a:prstGeom prst="rect">
-              <a:avLst/>
-            </a:prstGeom>
-            <a:solidFill>
-              <a:schemeClr val="bg1"/>
-            </a:solidFill>
-          </p:spPr>
-          <p:txBody>
-            <a:bodyPr wrap="square" rtlCol="0">
-              <a:spAutoFit/>
-            </a:bodyPr>
-            <a:lstStyle/>
-            <a:p>
-              <a:r>
-                <a:rPr lang="en-US" dirty="0" smtClean="0"/>
-                <a:t>Manhattan Borough Coincidence Ratios of Failing features</a:t>
-              </a:r>
-              <a:endParaRPr lang="en-US" dirty="0"/>
-            </a:p>
-          </p:txBody>
-        </p:sp>
-      </p:grpSp>
+          <a:prstGeom prst="rect">
+            <a:avLst/>
+          </a:prstGeom>
+        </p:spPr>
+      </p:pic>
+      <p:sp>
+        <p:nvSpPr>
+          <p:cNvPr id="6" name="TextBox 5"/>
+          <p:cNvSpPr txBox="1"/>
+          <p:nvPr/>
+        </p:nvSpPr>
+        <p:spPr>
+          <a:xfrm>
+            <a:off x="1837233" y="66007"/>
+            <a:ext cx="5743730" cy="369332"/>
+          </a:xfrm>
+          <a:prstGeom prst="rect">
+            <a:avLst/>
+          </a:prstGeom>
+          <a:solidFill>
+            <a:schemeClr val="bg1"/>
+          </a:solidFill>
+        </p:spPr>
+        <p:txBody>
+          <a:bodyPr wrap="square" rtlCol="0">
+            <a:spAutoFit/>
+          </a:bodyPr>
+          <a:lstStyle/>
+          <a:p>
+            <a:r>
+              <a:rPr lang="en-US" dirty="0" smtClean="0"/>
+              <a:t>Manhattan Borough Coincidence Ratios of Failing features</a:t>
+            </a:r>
+            <a:endParaRPr lang="en-US" dirty="0"/>
+          </a:p>
+        </p:txBody>
+      </p:sp>
     </p:spTree>
     <p:extLst>
       <p:ext uri="{BB962C8B-B14F-4D97-AF65-F5344CB8AC3E}">
@@ -3386,83 +3378,68 @@
           <a:chExt cx="0" cy="0"/>
         </a:xfrm>
       </p:grpSpPr>
-      <p:grpSp>
-        <p:nvGrpSpPr>
-          <p:cNvPr id="3" name="Group 2"/>
-          <p:cNvGrpSpPr/>
+      <p:pic>
+        <p:nvPicPr>
+          <p:cNvPr id="4" name="Picture 3" descr="Brooklyn.png"/>
+          <p:cNvPicPr>
+            <a:picLocks noChangeAspect="1"/>
+          </p:cNvPicPr>
           <p:nvPr/>
-        </p:nvGrpSpPr>
-        <p:grpSpPr>
+        </p:nvPicPr>
+        <p:blipFill>
+          <a:blip r:embed="rId2">
+            <a:extLst>
+              <a:ext uri="{28A0092B-C50C-407E-A947-70E740481C1C}">
+                <a14:useLocalDpi xmlns:a14="http://schemas.microsoft.com/office/drawing/2010/main" val="0"/>
+              </a:ext>
+            </a:extLst>
+          </a:blip>
+          <a:stretch>
+            <a:fillRect/>
+          </a:stretch>
+        </p:blipFill>
+        <p:spPr>
           <a:xfrm>
             <a:off x="946291" y="0"/>
             <a:ext cx="7251419" cy="6858000"/>
-            <a:chOff x="0" y="0"/>
-            <a:chExt cx="7251419" cy="6858000"/>
           </a:xfrm>
-        </p:grpSpPr>
-        <p:pic>
-          <p:nvPicPr>
-            <p:cNvPr id="2" name="Picture 1" descr="Brooklyn.png"/>
-            <p:cNvPicPr>
-              <a:picLocks noChangeAspect="1"/>
-            </p:cNvPicPr>
-            <p:nvPr/>
-          </p:nvPicPr>
-          <p:blipFill>
-            <a:blip r:embed="rId2">
-              <a:extLst>
-                <a:ext uri="{28A0092B-C50C-407E-A947-70E740481C1C}">
-                  <a14:useLocalDpi xmlns:a14="http://schemas.microsoft.com/office/drawing/2010/main" val="0"/>
-                </a:ext>
-              </a:extLst>
-            </a:blip>
-            <a:stretch>
-              <a:fillRect/>
-            </a:stretch>
-          </p:blipFill>
-          <p:spPr>
-            <a:xfrm>
-              <a:off x="0" y="0"/>
-              <a:ext cx="7251419" cy="6858000"/>
-            </a:xfrm>
-            <a:prstGeom prst="rect">
-              <a:avLst/>
-            </a:prstGeom>
-          </p:spPr>
-        </p:pic>
-        <p:sp>
-          <p:nvSpPr>
-            <p:cNvPr id="6" name="TextBox 5"/>
-            <p:cNvSpPr txBox="1"/>
-            <p:nvPr/>
-          </p:nvSpPr>
-          <p:spPr>
-            <a:xfrm>
-              <a:off x="871985" y="66007"/>
-              <a:ext cx="5611038" cy="369332"/>
-            </a:xfrm>
-            <a:prstGeom prst="rect">
-              <a:avLst/>
-            </a:prstGeom>
-            <a:solidFill>
-              <a:schemeClr val="bg1"/>
-            </a:solidFill>
-          </p:spPr>
-          <p:txBody>
-            <a:bodyPr wrap="square" rtlCol="0">
-              <a:spAutoFit/>
-            </a:bodyPr>
-            <a:lstStyle/>
-            <a:p>
-              <a:r>
-                <a:rPr lang="en-US" dirty="0" smtClean="0"/>
-                <a:t>Brooklyn Borough Coincidence Ratios of Failing features</a:t>
-              </a:r>
-              <a:endParaRPr lang="en-US" dirty="0"/>
-            </a:p>
-          </p:txBody>
-        </p:sp>
-      </p:grpSp>
+          <a:prstGeom prst="rect">
+            <a:avLst/>
+          </a:prstGeom>
+        </p:spPr>
+      </p:pic>
+      <p:sp>
+        <p:nvSpPr>
+          <p:cNvPr id="6" name="TextBox 5"/>
+          <p:cNvSpPr txBox="1"/>
+          <p:nvPr/>
+        </p:nvSpPr>
+        <p:spPr>
+          <a:xfrm>
+            <a:off x="1818276" y="66007"/>
+            <a:ext cx="5611038" cy="369332"/>
+          </a:xfrm>
+          <a:prstGeom prst="rect">
+            <a:avLst/>
+          </a:prstGeom>
+          <a:solidFill>
+            <a:schemeClr val="bg1"/>
+          </a:solidFill>
+        </p:spPr>
+        <p:txBody>
+          <a:bodyPr wrap="square" rtlCol="0">
+            <a:spAutoFit/>
+          </a:bodyPr>
+          <a:lstStyle/>
+          <a:p>
+            <a:r>
+              <a:rPr lang="en-US" dirty="0" smtClean="0"/>
+              <a:t>Brooklyn Borough Coincidence Ratios of Failing features</a:t>
+            </a:r>
+            <a:endParaRPr lang="en-US" dirty="0"/>
+          </a:p>
+        </p:txBody>
+      </p:sp>
     </p:spTree>
     <p:extLst>
       <p:ext uri="{BB962C8B-B14F-4D97-AF65-F5344CB8AC3E}">
@@ -3500,83 +3477,68 @@
           <a:chExt cx="0" cy="0"/>
         </a:xfrm>
       </p:grpSpPr>
-      <p:grpSp>
-        <p:nvGrpSpPr>
-          <p:cNvPr id="4" name="Group 3"/>
-          <p:cNvGrpSpPr/>
+      <p:pic>
+        <p:nvPicPr>
+          <p:cNvPr id="2" name="Picture 1" descr="Queen.png"/>
+          <p:cNvPicPr>
+            <a:picLocks noChangeAspect="1"/>
+          </p:cNvPicPr>
           <p:nvPr/>
-        </p:nvGrpSpPr>
-        <p:grpSpPr>
+        </p:nvPicPr>
+        <p:blipFill>
+          <a:blip r:embed="rId2">
+            <a:extLst>
+              <a:ext uri="{28A0092B-C50C-407E-A947-70E740481C1C}">
+                <a14:useLocalDpi xmlns:a14="http://schemas.microsoft.com/office/drawing/2010/main" val="0"/>
+              </a:ext>
+            </a:extLst>
+          </a:blip>
+          <a:stretch>
+            <a:fillRect/>
+          </a:stretch>
+        </p:blipFill>
+        <p:spPr>
           <a:xfrm>
             <a:off x="946291" y="0"/>
             <a:ext cx="7251419" cy="6858000"/>
-            <a:chOff x="0" y="0"/>
-            <a:chExt cx="7251419" cy="6858000"/>
           </a:xfrm>
-        </p:grpSpPr>
-        <p:pic>
-          <p:nvPicPr>
-            <p:cNvPr id="3" name="Picture 2" descr="Queens.png"/>
-            <p:cNvPicPr>
-              <a:picLocks noChangeAspect="1"/>
-            </p:cNvPicPr>
-            <p:nvPr/>
-          </p:nvPicPr>
-          <p:blipFill>
-            <a:blip r:embed="rId2">
-              <a:extLst>
-                <a:ext uri="{28A0092B-C50C-407E-A947-70E740481C1C}">
-                  <a14:useLocalDpi xmlns:a14="http://schemas.microsoft.com/office/drawing/2010/main" val="0"/>
-                </a:ext>
-              </a:extLst>
-            </a:blip>
-            <a:stretch>
-              <a:fillRect/>
-            </a:stretch>
-          </p:blipFill>
-          <p:spPr>
-            <a:xfrm>
-              <a:off x="0" y="0"/>
-              <a:ext cx="7251419" cy="6858000"/>
-            </a:xfrm>
-            <a:prstGeom prst="rect">
-              <a:avLst/>
-            </a:prstGeom>
-          </p:spPr>
-        </p:pic>
-        <p:sp>
-          <p:nvSpPr>
-            <p:cNvPr id="6" name="TextBox 5"/>
-            <p:cNvSpPr txBox="1"/>
-            <p:nvPr/>
-          </p:nvSpPr>
-          <p:spPr>
-            <a:xfrm>
-              <a:off x="871985" y="66007"/>
-              <a:ext cx="5611038" cy="369332"/>
-            </a:xfrm>
-            <a:prstGeom prst="rect">
-              <a:avLst/>
-            </a:prstGeom>
-            <a:solidFill>
-              <a:schemeClr val="bg1"/>
-            </a:solidFill>
-          </p:spPr>
-          <p:txBody>
-            <a:bodyPr wrap="square" rtlCol="0">
-              <a:spAutoFit/>
-            </a:bodyPr>
-            <a:lstStyle/>
-            <a:p>
-              <a:r>
-                <a:rPr lang="en-US" dirty="0" smtClean="0"/>
-                <a:t>Queens Borough Coincidence Ratios of Failing features</a:t>
-              </a:r>
-              <a:endParaRPr lang="en-US" dirty="0"/>
-            </a:p>
-          </p:txBody>
-        </p:sp>
-      </p:grpSp>
+          <a:prstGeom prst="rect">
+            <a:avLst/>
+          </a:prstGeom>
+        </p:spPr>
+      </p:pic>
+      <p:sp>
+        <p:nvSpPr>
+          <p:cNvPr id="6" name="TextBox 5"/>
+          <p:cNvSpPr txBox="1"/>
+          <p:nvPr/>
+        </p:nvSpPr>
+        <p:spPr>
+          <a:xfrm>
+            <a:off x="1818276" y="66007"/>
+            <a:ext cx="5611038" cy="369332"/>
+          </a:xfrm>
+          <a:prstGeom prst="rect">
+            <a:avLst/>
+          </a:prstGeom>
+          <a:solidFill>
+            <a:schemeClr val="bg1"/>
+          </a:solidFill>
+        </p:spPr>
+        <p:txBody>
+          <a:bodyPr wrap="square" rtlCol="0">
+            <a:spAutoFit/>
+          </a:bodyPr>
+          <a:lstStyle/>
+          <a:p>
+            <a:r>
+              <a:rPr lang="en-US" dirty="0" smtClean="0"/>
+              <a:t>Queens Borough Coincidence Ratios of Failing features</a:t>
+            </a:r>
+            <a:endParaRPr lang="en-US" dirty="0"/>
+          </a:p>
+        </p:txBody>
+      </p:sp>
     </p:spTree>
     <p:extLst>
       <p:ext uri="{BB962C8B-B14F-4D97-AF65-F5344CB8AC3E}">
@@ -3614,83 +3576,68 @@
           <a:chExt cx="0" cy="0"/>
         </a:xfrm>
       </p:grpSpPr>
-      <p:grpSp>
-        <p:nvGrpSpPr>
-          <p:cNvPr id="4" name="Group 3"/>
-          <p:cNvGrpSpPr/>
+      <p:pic>
+        <p:nvPicPr>
+          <p:cNvPr id="3" name="Picture 2" descr="Bronx.png"/>
+          <p:cNvPicPr>
+            <a:picLocks noChangeAspect="1"/>
+          </p:cNvPicPr>
           <p:nvPr/>
-        </p:nvGrpSpPr>
-        <p:grpSpPr>
+        </p:nvPicPr>
+        <p:blipFill>
+          <a:blip r:embed="rId2">
+            <a:extLst>
+              <a:ext uri="{28A0092B-C50C-407E-A947-70E740481C1C}">
+                <a14:useLocalDpi xmlns:a14="http://schemas.microsoft.com/office/drawing/2010/main" val="0"/>
+              </a:ext>
+            </a:extLst>
+          </a:blip>
+          <a:stretch>
+            <a:fillRect/>
+          </a:stretch>
+        </p:blipFill>
+        <p:spPr>
           <a:xfrm>
             <a:off x="946291" y="0"/>
             <a:ext cx="7251419" cy="6858000"/>
-            <a:chOff x="0" y="0"/>
-            <a:chExt cx="7251419" cy="6858000"/>
           </a:xfrm>
-        </p:grpSpPr>
-        <p:pic>
-          <p:nvPicPr>
-            <p:cNvPr id="2" name="Picture 1" descr="Bronx.png"/>
-            <p:cNvPicPr>
-              <a:picLocks noChangeAspect="1"/>
-            </p:cNvPicPr>
-            <p:nvPr/>
-          </p:nvPicPr>
-          <p:blipFill>
-            <a:blip r:embed="rId2">
-              <a:extLst>
-                <a:ext uri="{28A0092B-C50C-407E-A947-70E740481C1C}">
-                  <a14:useLocalDpi xmlns:a14="http://schemas.microsoft.com/office/drawing/2010/main" val="0"/>
-                </a:ext>
-              </a:extLst>
-            </a:blip>
-            <a:stretch>
-              <a:fillRect/>
-            </a:stretch>
-          </p:blipFill>
-          <p:spPr>
-            <a:xfrm>
-              <a:off x="0" y="0"/>
-              <a:ext cx="7251419" cy="6858000"/>
-            </a:xfrm>
-            <a:prstGeom prst="rect">
-              <a:avLst/>
-            </a:prstGeom>
-          </p:spPr>
-        </p:pic>
-        <p:sp>
-          <p:nvSpPr>
-            <p:cNvPr id="6" name="TextBox 5"/>
-            <p:cNvSpPr txBox="1"/>
-            <p:nvPr/>
-          </p:nvSpPr>
-          <p:spPr>
-            <a:xfrm>
-              <a:off x="871985" y="66007"/>
-              <a:ext cx="5611038" cy="369332"/>
-            </a:xfrm>
-            <a:prstGeom prst="rect">
-              <a:avLst/>
-            </a:prstGeom>
-            <a:solidFill>
-              <a:schemeClr val="bg1"/>
-            </a:solidFill>
-          </p:spPr>
-          <p:txBody>
-            <a:bodyPr wrap="square" rtlCol="0">
-              <a:spAutoFit/>
-            </a:bodyPr>
-            <a:lstStyle/>
-            <a:p>
-              <a:r>
-                <a:rPr lang="en-US" dirty="0" smtClean="0"/>
-                <a:t>Bronx Borough Coincidence Ratios of Failing features</a:t>
-              </a:r>
-              <a:endParaRPr lang="en-US" dirty="0"/>
-            </a:p>
-          </p:txBody>
-        </p:sp>
-      </p:grpSp>
+          <a:prstGeom prst="rect">
+            <a:avLst/>
+          </a:prstGeom>
+        </p:spPr>
+      </p:pic>
+      <p:sp>
+        <p:nvSpPr>
+          <p:cNvPr id="6" name="TextBox 5"/>
+          <p:cNvSpPr txBox="1"/>
+          <p:nvPr/>
+        </p:nvSpPr>
+        <p:spPr>
+          <a:xfrm>
+            <a:off x="1818276" y="66007"/>
+            <a:ext cx="5611038" cy="369332"/>
+          </a:xfrm>
+          <a:prstGeom prst="rect">
+            <a:avLst/>
+          </a:prstGeom>
+          <a:solidFill>
+            <a:schemeClr val="bg1"/>
+          </a:solidFill>
+        </p:spPr>
+        <p:txBody>
+          <a:bodyPr wrap="square" rtlCol="0">
+            <a:spAutoFit/>
+          </a:bodyPr>
+          <a:lstStyle/>
+          <a:p>
+            <a:r>
+              <a:rPr lang="en-US" dirty="0" smtClean="0"/>
+              <a:t>Bronx Borough Coincidence Ratios of Failing features</a:t>
+            </a:r>
+            <a:endParaRPr lang="en-US" dirty="0"/>
+          </a:p>
+        </p:txBody>
+      </p:sp>
     </p:spTree>
     <p:extLst>
       <p:ext uri="{BB962C8B-B14F-4D97-AF65-F5344CB8AC3E}">
@@ -3728,83 +3675,72 @@
           <a:chExt cx="0" cy="0"/>
         </a:xfrm>
       </p:grpSpPr>
-      <p:grpSp>
-        <p:nvGrpSpPr>
-          <p:cNvPr id="4" name="Group 3"/>
-          <p:cNvGrpSpPr/>
+      <p:pic>
+        <p:nvPicPr>
+          <p:cNvPr id="2" name="Picture 1" descr="StatenIsland.png"/>
+          <p:cNvPicPr>
+            <a:picLocks noChangeAspect="1"/>
+          </p:cNvPicPr>
           <p:nvPr/>
-        </p:nvGrpSpPr>
-        <p:grpSpPr>
+        </p:nvPicPr>
+        <p:blipFill>
+          <a:blip r:embed="rId2">
+            <a:extLst>
+              <a:ext uri="{28A0092B-C50C-407E-A947-70E740481C1C}">
+                <a14:useLocalDpi xmlns:a14="http://schemas.microsoft.com/office/drawing/2010/main" val="0"/>
+              </a:ext>
+            </a:extLst>
+          </a:blip>
+          <a:stretch>
+            <a:fillRect/>
+          </a:stretch>
+        </p:blipFill>
+        <p:spPr>
           <a:xfrm>
             <a:off x="946291" y="0"/>
             <a:ext cx="7251419" cy="6858000"/>
-            <a:chOff x="0" y="0"/>
-            <a:chExt cx="7251419" cy="6858000"/>
           </a:xfrm>
-        </p:grpSpPr>
-        <p:pic>
-          <p:nvPicPr>
-            <p:cNvPr id="3" name="Picture 2" descr="Richmond.png"/>
-            <p:cNvPicPr>
-              <a:picLocks noChangeAspect="1"/>
-            </p:cNvPicPr>
-            <p:nvPr/>
-          </p:nvPicPr>
-          <p:blipFill>
-            <a:blip r:embed="rId2">
-              <a:extLst>
-                <a:ext uri="{28A0092B-C50C-407E-A947-70E740481C1C}">
-                  <a14:useLocalDpi xmlns:a14="http://schemas.microsoft.com/office/drawing/2010/main" val="0"/>
-                </a:ext>
-              </a:extLst>
-            </a:blip>
-            <a:stretch>
-              <a:fillRect/>
-            </a:stretch>
-          </p:blipFill>
-          <p:spPr>
-            <a:xfrm>
-              <a:off x="0" y="0"/>
-              <a:ext cx="7251419" cy="6858000"/>
-            </a:xfrm>
-            <a:prstGeom prst="rect">
-              <a:avLst/>
-            </a:prstGeom>
-          </p:spPr>
-        </p:pic>
-        <p:sp>
-          <p:nvSpPr>
-            <p:cNvPr id="6" name="TextBox 5"/>
-            <p:cNvSpPr txBox="1"/>
-            <p:nvPr/>
-          </p:nvSpPr>
-          <p:spPr>
-            <a:xfrm>
-              <a:off x="871985" y="66007"/>
-              <a:ext cx="5611038" cy="369332"/>
-            </a:xfrm>
-            <a:prstGeom prst="rect">
-              <a:avLst/>
-            </a:prstGeom>
-            <a:solidFill>
-              <a:schemeClr val="bg1"/>
-            </a:solidFill>
-          </p:spPr>
-          <p:txBody>
-            <a:bodyPr wrap="square" rtlCol="0">
-              <a:spAutoFit/>
-            </a:bodyPr>
-            <a:lstStyle/>
-            <a:p>
-              <a:r>
-                <a:rPr lang="en-US" dirty="0" smtClean="0"/>
-                <a:t>Richmond Borough Coincidence Ratios of Failing features</a:t>
-              </a:r>
-              <a:endParaRPr lang="en-US" dirty="0"/>
-            </a:p>
-          </p:txBody>
-        </p:sp>
-      </p:grpSp>
+          <a:prstGeom prst="rect">
+            <a:avLst/>
+          </a:prstGeom>
+        </p:spPr>
+      </p:pic>
+      <p:sp>
+        <p:nvSpPr>
+          <p:cNvPr id="6" name="TextBox 5"/>
+          <p:cNvSpPr txBox="1"/>
+          <p:nvPr/>
+        </p:nvSpPr>
+        <p:spPr>
+          <a:xfrm>
+            <a:off x="1668146" y="66007"/>
+            <a:ext cx="5876424" cy="369332"/>
+          </a:xfrm>
+          <a:prstGeom prst="rect">
+            <a:avLst/>
+          </a:prstGeom>
+          <a:solidFill>
+            <a:schemeClr val="bg1"/>
+          </a:solidFill>
+        </p:spPr>
+        <p:txBody>
+          <a:bodyPr wrap="square" rtlCol="0">
+            <a:spAutoFit/>
+          </a:bodyPr>
+          <a:lstStyle/>
+          <a:p>
+            <a:r>
+              <a:rPr lang="en-US" dirty="0" smtClean="0"/>
+              <a:t>Staten Island Borough </a:t>
+            </a:r>
+            <a:r>
+              <a:rPr lang="en-US" dirty="0" smtClean="0"/>
+              <a:t>Coincidence Ratios of Failing features</a:t>
+            </a:r>
+            <a:endParaRPr lang="en-US" dirty="0"/>
+          </a:p>
+        </p:txBody>
+      </p:sp>
     </p:spTree>
     <p:extLst>
       <p:ext uri="{BB962C8B-B14F-4D97-AF65-F5344CB8AC3E}">

</xml_diff>

<commit_message>
Updated slide to mach the CUSP theme
</commit_message>
<xml_diff>
--- a/Outputs/CoincedencesPresentation.pptx
+++ b/Outputs/CoincedencesPresentation.pptx
@@ -3103,7 +3103,7 @@
       </p:grpSpPr>
       <p:sp>
         <p:nvSpPr>
-          <p:cNvPr id="2" name="Title 1"/>
+          <p:cNvPr id="5" name="Title 1"/>
           <p:cNvSpPr>
             <a:spLocks noGrp="1"/>
           </p:cNvSpPr>
@@ -3111,7 +3111,12 @@
             <p:ph type="ctrTitle"/>
           </p:nvPr>
         </p:nvSpPr>
-        <p:spPr/>
+        <p:spPr>
+          <a:xfrm>
+            <a:off x="685800" y="2130425"/>
+            <a:ext cx="7772400" cy="1470025"/>
+          </a:xfrm>
+        </p:spPr>
         <p:txBody>
           <a:bodyPr/>
           <a:lstStyle/>
@@ -3126,7 +3131,7 @@
       </p:sp>
       <p:sp>
         <p:nvSpPr>
-          <p:cNvPr id="3" name="Subtitle 2"/>
+          <p:cNvPr id="6" name="Subtitle 2"/>
           <p:cNvSpPr>
             <a:spLocks noGrp="1"/>
           </p:cNvSpPr>
@@ -3134,15 +3139,137 @@
             <p:ph type="subTitle" idx="1"/>
           </p:nvPr>
         </p:nvSpPr>
-        <p:spPr/>
-        <p:txBody>
-          <a:bodyPr/>
-          <a:lstStyle/>
-          <a:p>
-            <a:endParaRPr lang="en-US"/>
-          </a:p>
-        </p:txBody>
-      </p:sp>
+        <p:spPr>
+          <a:xfrm>
+            <a:off x="1371600" y="3886200"/>
+            <a:ext cx="6400800" cy="1752600"/>
+          </a:xfrm>
+        </p:spPr>
+        <p:txBody>
+          <a:bodyPr>
+            <a:normAutofit/>
+          </a:bodyPr>
+          <a:lstStyle/>
+          <a:p>
+            <a:r>
+              <a:rPr lang="en-US" sz="2800" dirty="0" smtClean="0"/>
+              <a:t>NYC Department of Parks and Recreation</a:t>
+            </a:r>
+          </a:p>
+          <a:p>
+            <a:pPr algn="r"/>
+            <a:r>
+              <a:rPr lang="en-US" sz="2000" dirty="0" smtClean="0"/>
+              <a:t>April 23, 2015</a:t>
+            </a:r>
+            <a:endParaRPr lang="en-US" sz="2000" dirty="0"/>
+          </a:p>
+        </p:txBody>
+      </p:sp>
+      <p:sp>
+        <p:nvSpPr>
+          <p:cNvPr id="7" name="Rectangle 6"/>
+          <p:cNvSpPr/>
+          <p:nvPr/>
+        </p:nvSpPr>
+        <p:spPr>
+          <a:xfrm>
+            <a:off x="4453217" y="3244334"/>
+            <a:ext cx="237566" cy="369332"/>
+          </a:xfrm>
+          <a:prstGeom prst="rect">
+            <a:avLst/>
+          </a:prstGeom>
+        </p:spPr>
+        <p:txBody>
+          <a:bodyPr wrap="none">
+            <a:spAutoFit/>
+          </a:bodyPr>
+          <a:lstStyle/>
+          <a:p>
+            <a:r>
+              <a:rPr lang="en-US" dirty="0"/>
+              <a:t> </a:t>
+            </a:r>
+          </a:p>
+        </p:txBody>
+      </p:sp>
+      <p:sp>
+        <p:nvSpPr>
+          <p:cNvPr id="8" name="Rectangle 7"/>
+          <p:cNvSpPr/>
+          <p:nvPr/>
+        </p:nvSpPr>
+        <p:spPr>
+          <a:xfrm>
+            <a:off x="4453217" y="3244334"/>
+            <a:ext cx="237566" cy="369332"/>
+          </a:xfrm>
+          <a:prstGeom prst="rect">
+            <a:avLst/>
+          </a:prstGeom>
+        </p:spPr>
+        <p:txBody>
+          <a:bodyPr wrap="none">
+            <a:spAutoFit/>
+          </a:bodyPr>
+          <a:lstStyle/>
+          <a:p>
+            <a:r>
+              <a:rPr lang="en-US" dirty="0"/>
+              <a:t> </a:t>
+            </a:r>
+          </a:p>
+        </p:txBody>
+      </p:sp>
+      <p:pic>
+        <p:nvPicPr>
+          <p:cNvPr id="9" name="Picture 8"/>
+          <p:cNvPicPr>
+            <a:picLocks noChangeAspect="1"/>
+          </p:cNvPicPr>
+          <p:nvPr/>
+        </p:nvPicPr>
+        <p:blipFill>
+          <a:blip r:embed="rId2"/>
+          <a:stretch>
+            <a:fillRect/>
+          </a:stretch>
+        </p:blipFill>
+        <p:spPr>
+          <a:xfrm>
+            <a:off x="7772400" y="83977"/>
+            <a:ext cx="1278294" cy="758310"/>
+          </a:xfrm>
+          <a:prstGeom prst="rect">
+            <a:avLst/>
+          </a:prstGeom>
+        </p:spPr>
+      </p:pic>
+      <p:pic>
+        <p:nvPicPr>
+          <p:cNvPr id="10" name="Picture 9"/>
+          <p:cNvPicPr>
+            <a:picLocks noChangeAspect="1"/>
+          </p:cNvPicPr>
+          <p:nvPr/>
+        </p:nvPicPr>
+        <p:blipFill>
+          <a:blip r:embed="rId3"/>
+          <a:stretch>
+            <a:fillRect/>
+          </a:stretch>
+        </p:blipFill>
+        <p:spPr>
+          <a:xfrm>
+            <a:off x="118091" y="79115"/>
+            <a:ext cx="949885" cy="350093"/>
+          </a:xfrm>
+          <a:prstGeom prst="rect">
+            <a:avLst/>
+          </a:prstGeom>
+        </p:spPr>
+      </p:pic>
     </p:spTree>
     <p:extLst>
       <p:ext uri="{BB962C8B-B14F-4D97-AF65-F5344CB8AC3E}">
@@ -3731,11 +3858,7 @@
           <a:p>
             <a:r>
               <a:rPr lang="en-US" dirty="0" smtClean="0"/>
-              <a:t>Staten Island Borough </a:t>
-            </a:r>
-            <a:r>
-              <a:rPr lang="en-US" dirty="0" smtClean="0"/>
-              <a:t>Coincidence Ratios of Failing features</a:t>
+              <a:t>Staten Island Borough Coincidence Ratios of Failing features</a:t>
             </a:r>
             <a:endParaRPr lang="en-US" dirty="0"/>
           </a:p>

</xml_diff>